<commit_message>
added parameter tests and SC restart
</commit_message>
<xml_diff>
--- a/Presentation/presentation.pptx
+++ b/Presentation/presentation.pptx
@@ -4012,8 +4012,14 @@
           <a:p>
             <a:r>
               <a:rPr lang="en-US" dirty="0"/>
-              <a:t>Results</a:t>
-            </a:r>
+              <a:t>Parameter tests</a:t>
+            </a:r>
+          </a:p>
+          <a:p>
+            <a:pPr marL="0" indent="0">
+              <a:buNone/>
+            </a:pPr>
+            <a:endParaRPr lang="en-US" dirty="0"/>
           </a:p>
           <a:p>
             <a:endParaRPr lang="en-US" dirty="0"/>
@@ -4228,10 +4234,15 @@
             </a:r>
           </a:p>
           <a:p>
-            <a:pPr marL="914400" lvl="1" indent="-457200">
-              <a:buFont typeface="+mj-lt"/>
-              <a:buAutoNum type="arabicPeriod"/>
-            </a:pPr>
+            <a:pPr marL="400050"/>
+            <a:r>
+              <a:rPr lang="en-US" dirty="0"/>
+              <a:t>If the solution is infeasible the sequential construction </a:t>
+            </a:r>
+            <a:r>
+              <a:rPr lang="en-US"/>
+              <a:t>algorithm restarts</a:t>
+            </a:r>
             <a:endParaRPr lang="en-US" dirty="0"/>
           </a:p>
           <a:p>
@@ -5058,10 +5069,78 @@
           <a:lstStyle/>
           <a:p>
             <a:r>
+              <a:rPr lang="en-US" dirty="0"/>
+              <a:t>For the cost function of the initial solutions we found out that we have get the best solutions if the focus is in the time window violations</a:t>
+            </a:r>
+          </a:p>
+          <a:p>
+            <a:pPr lvl="1"/>
+            <a:r>
+              <a:rPr lang="en-US" dirty="0"/>
+              <a:t>In our solution we have chosen 0.01 for the </a:t>
+            </a:r>
+            <a:r>
+              <a:rPr lang="en-US" b="1" dirty="0"/>
+              <a:t>route duration</a:t>
+            </a:r>
+            <a:r>
+              <a:rPr lang="en-US" dirty="0"/>
+              <a:t>, 0.80 for the </a:t>
+            </a:r>
+            <a:r>
+              <a:rPr lang="en-US" b="1" dirty="0"/>
+              <a:t>time window violations </a:t>
+            </a:r>
+            <a:r>
+              <a:rPr lang="en-US" dirty="0"/>
+              <a:t>and 0.19 for the </a:t>
+            </a:r>
+            <a:r>
+              <a:rPr lang="en-US" b="1" dirty="0"/>
+              <a:t>capacity violations</a:t>
+            </a:r>
+          </a:p>
+          <a:p>
+            <a:r>
+              <a:rPr lang="en-US" dirty="0"/>
+              <a:t>The LNS found good solutions with the following parameters:</a:t>
+            </a:r>
+          </a:p>
+          <a:p>
+            <a:pPr lvl="1"/>
+            <a:r>
               <a:rPr lang="en-US" dirty="0" err="1"/>
-              <a:t>ToDo</a:t>
-            </a:r>
-            <a:endParaRPr lang="en-US" dirty="0"/>
+              <a:t>maxSize</a:t>
+            </a:r>
+            <a:r>
+              <a:rPr lang="en-US" dirty="0"/>
+              <a:t> = 3</a:t>
+            </a:r>
+          </a:p>
+          <a:p>
+            <a:pPr lvl="1"/>
+            <a:r>
+              <a:rPr lang="en-US" dirty="0"/>
+              <a:t>range = 1</a:t>
+            </a:r>
+          </a:p>
+          <a:p>
+            <a:pPr lvl="1"/>
+            <a:r>
+              <a:rPr lang="en-US" dirty="0"/>
+              <a:t>iterations = 5000</a:t>
+            </a:r>
+          </a:p>
+          <a:p>
+            <a:pPr lvl="1"/>
+            <a:r>
+              <a:rPr lang="en-US" dirty="0" err="1"/>
+              <a:t>probabilty</a:t>
+            </a:r>
+            <a:r>
+              <a:rPr lang="en-US" dirty="0"/>
+              <a:t> to accept worse solutions = 0.25 </a:t>
+            </a:r>
           </a:p>
         </p:txBody>
       </p:sp>
@@ -5082,7 +5161,7 @@
           <a:p>
             <a:r>
               <a:rPr lang="en-US" dirty="0"/>
-              <a:t>Results</a:t>
+              <a:t>Parameter tests</a:t>
             </a:r>
           </a:p>
         </p:txBody>

</xml_diff>

<commit_message>
correct a little mistake
</commit_message>
<xml_diff>
--- a/Presentation/presentation.pptx
+++ b/Presentation/presentation.pptx
@@ -289,7 +289,7 @@
               <a:pPr>
                 <a:defRPr/>
               </a:pPr>
-              <a:t>20.02.2017</a:t>
+              <a:t>21.02.2017</a:t>
             </a:fld>
             <a:endParaRPr lang="de-DE"/>
           </a:p>
@@ -504,7 +504,7 @@
               <a:pPr>
                 <a:defRPr/>
               </a:pPr>
-              <a:t>20.02.2017</a:t>
+              <a:t>21.02.2017</a:t>
             </a:fld>
             <a:endParaRPr lang="de-DE"/>
           </a:p>
@@ -5152,7 +5152,15 @@
           <a:p>
             <a:r>
               <a:rPr lang="en-US" dirty="0"/>
-              <a:t>Further improvements can be achieved by using a algorithm configurator</a:t>
+              <a:t>Further improvements can be achieved by </a:t>
+            </a:r>
+            <a:r>
+              <a:rPr lang="en-US"/>
+              <a:t>using an </a:t>
+            </a:r>
+            <a:r>
+              <a:rPr lang="en-US" dirty="0"/>
+              <a:t>algorithm configurator</a:t>
             </a:r>
           </a:p>
         </p:txBody>

</xml_diff>